<commit_message>
Arreglo de hipervinculos presentación
</commit_message>
<xml_diff>
--- a/Documentos/Diapositiva/Sustentación Segundo Trimestre.pptx
+++ b/Documentos/Diapositiva/Sustentación Segundo Trimestre.pptx
@@ -13,10 +13,10 @@
   <p:sldIdLst>
     <p:sldId id="265" r:id="rId5"/>
     <p:sldId id="310" r:id="rId6"/>
-    <p:sldId id="311" r:id="rId7"/>
-    <p:sldId id="313" r:id="rId8"/>
-    <p:sldId id="312" r:id="rId9"/>
-    <p:sldId id="314" r:id="rId10"/>
+    <p:sldId id="313" r:id="rId7"/>
+    <p:sldId id="312" r:id="rId8"/>
+    <p:sldId id="314" r:id="rId9"/>
+    <p:sldId id="315" r:id="rId10"/>
   </p:sldIdLst>
   <p:sldSz cx="12188825" cy="6858000"/>
   <p:notesSz cx="6858000" cy="9144000"/>
@@ -140,6 +140,12 @@
 </p:presentation>
 </file>
 
+<file path=ppt/commentAuthors.xml><?xml version="1.0" encoding="utf-8"?>
+<p:cmAuthorLst xmlns:a="http://schemas.openxmlformats.org/drawingml/2006/main" xmlns:r="http://schemas.openxmlformats.org/officeDocument/2006/relationships" xmlns:p="http://schemas.openxmlformats.org/presentationml/2006/main">
+  <p:cmAuthor id="2" name="Autor" initials="A" lastIdx="0" clrIdx="1"/>
+</p:cmAuthorLst>
+</file>
+
 <file path=ppt/handoutMasters/handoutMaster1.xml><?xml version="1.0" encoding="utf-8"?>
 <p:handoutMaster xmlns:a="http://schemas.openxmlformats.org/drawingml/2006/main" xmlns:r="http://schemas.openxmlformats.org/officeDocument/2006/relationships" xmlns:p="http://schemas.openxmlformats.org/presentationml/2006/main">
   <p:cSld>
@@ -224,7 +230,7 @@
             <a:pPr algn="r" rtl="0"/>
             <a:fld id="{DA61EFE9-9F30-4528-BDDA-C859CD15CA56}" type="datetime1">
               <a:rPr lang="es-ES" smtClean="0"/>
-              <a:t>13/12/2019</a:t>
+              <a:t>16/12/2019</a:t>
             </a:fld>
             <a:endParaRPr lang="es-ES" dirty="0"/>
           </a:p>
@@ -394,7 +400,7 @@
             <a:fld id="{27373BEA-F5F3-4B6E-BA6B-D76E24101839}" type="datetime1">
               <a:rPr lang="es-ES" smtClean="0"/>
               <a:pPr/>
-              <a:t>13/12/2019</a:t>
+              <a:t>16/12/2019</a:t>
             </a:fld>
             <a:endParaRPr lang="es-ES" dirty="0"/>
           </a:p>
@@ -1000,7 +1006,7 @@
             <a:fld id="{F1AC609F-0362-4067-A47A-9F1CA2E45A65}" type="datetime1">
               <a:rPr lang="es-ES" smtClean="0"/>
               <a:pPr/>
-              <a:t>13/12/2019</a:t>
+              <a:t>16/12/2019</a:t>
             </a:fld>
             <a:endParaRPr lang="es-ES" dirty="0"/>
           </a:p>
@@ -1200,7 +1206,7 @@
             <a:fld id="{932AED9F-A6BB-400D-8F4D-616EB46A9405}" type="datetime1">
               <a:rPr lang="es-ES" smtClean="0"/>
               <a:pPr/>
-              <a:t>13/12/2019</a:t>
+              <a:t>16/12/2019</a:t>
             </a:fld>
             <a:endParaRPr lang="es-ES" dirty="0"/>
           </a:p>
@@ -1397,7 +1403,7 @@
             <a:fld id="{3D505D98-D4C1-4348-8F39-108EE2C76C21}" type="datetime1">
               <a:rPr lang="es-ES" smtClean="0"/>
               <a:pPr/>
-              <a:t>13/12/2019</a:t>
+              <a:t>16/12/2019</a:t>
             </a:fld>
             <a:endParaRPr lang="es-ES" dirty="0"/>
           </a:p>
@@ -1685,7 +1691,7 @@
             <a:fld id="{A12EF1AF-E5B2-41DB-BFF8-672C5BBF646A}" type="datetime1">
               <a:rPr lang="es-ES" smtClean="0"/>
               <a:pPr/>
-              <a:t>13/12/2019</a:t>
+              <a:t>16/12/2019</a:t>
             </a:fld>
             <a:endParaRPr lang="es-ES" dirty="0"/>
           </a:p>
@@ -1998,7 +2004,7 @@
             <a:fld id="{8E17C630-F8FA-4DCB-87FA-91D30885A2FD}" type="datetime1">
               <a:rPr lang="es-ES" smtClean="0"/>
               <a:pPr algn="r"/>
-              <a:t>13/12/2019</a:t>
+              <a:t>16/12/2019</a:t>
             </a:fld>
             <a:endParaRPr lang="es-ES" dirty="0"/>
           </a:p>
@@ -2462,7 +2468,7 @@
             <a:fld id="{724076C6-356A-48AB-A8EF-572AE4A11929}" type="datetime1">
               <a:rPr lang="es-ES" smtClean="0"/>
               <a:pPr/>
-              <a:t>13/12/2019</a:t>
+              <a:t>16/12/2019</a:t>
             </a:fld>
             <a:endParaRPr lang="es-ES" dirty="0"/>
           </a:p>
@@ -2600,7 +2606,7 @@
             <a:fld id="{E4A686D9-BDBD-4090-B19D-04E04F3CB648}" type="datetime1">
               <a:rPr lang="es-ES" smtClean="0"/>
               <a:pPr/>
-              <a:t>13/12/2019</a:t>
+              <a:t>16/12/2019</a:t>
             </a:fld>
             <a:endParaRPr lang="es-ES" dirty="0"/>
           </a:p>
@@ -2722,7 +2728,7 @@
             <a:fld id="{D1B4D0FB-1285-4974-8D4E-BCFCC0FA7978}" type="datetime1">
               <a:rPr lang="es-ES" smtClean="0"/>
               <a:pPr/>
-              <a:t>13/12/2019</a:t>
+              <a:t>16/12/2019</a:t>
             </a:fld>
             <a:endParaRPr lang="es-ES" dirty="0"/>
           </a:p>
@@ -3052,7 +3058,7 @@
             <a:fld id="{9C3D96D5-80C9-4ED7-89C2-CE590C3C6CB2}" type="datetime1">
               <a:rPr lang="es-ES" smtClean="0"/>
               <a:pPr/>
-              <a:t>13/12/2019</a:t>
+              <a:t>16/12/2019</a:t>
             </a:fld>
             <a:endParaRPr lang="es-ES" dirty="0"/>
           </a:p>
@@ -3372,7 +3378,7 @@
             <a:fld id="{DA911BAB-2490-48FD-81BA-E5EB85DA87AE}" type="datetime1">
               <a:rPr lang="es-ES" smtClean="0"/>
               <a:pPr/>
-              <a:t>13/12/2019</a:t>
+              <a:t>16/12/2019</a:t>
             </a:fld>
             <a:endParaRPr lang="es-ES" dirty="0"/>
           </a:p>
@@ -3610,7 +3616,7 @@
             <a:fld id="{7170E197-1079-4777-8273-53286CD6A787}" type="datetime1">
               <a:rPr lang="es-ES" smtClean="0"/>
               <a:pPr algn="r"/>
-              <a:t>13/12/2019</a:t>
+              <a:t>16/12/2019</a:t>
             </a:fld>
             <a:endParaRPr lang="es-ES" dirty="0"/>
           </a:p>
@@ -4075,7 +4081,12 @@
             <p:ph type="ctrTitle"/>
           </p:nvPr>
         </p:nvSpPr>
-        <p:spPr/>
+        <p:spPr>
+          <a:xfrm>
+            <a:off x="1060109" y="980728"/>
+            <a:ext cx="8229600" cy="2895600"/>
+          </a:xfrm>
+        </p:spPr>
         <p:txBody>
           <a:bodyPr rtlCol="0"/>
           <a:lstStyle/>
@@ -4106,65 +4117,54 @@
             <p:ph type="subTitle" idx="1"/>
           </p:nvPr>
         </p:nvSpPr>
-        <p:spPr/>
+        <p:spPr>
+          <a:xfrm>
+            <a:off x="1065213" y="4221088"/>
+            <a:ext cx="8229600" cy="1798712"/>
+          </a:xfrm>
+        </p:spPr>
         <p:txBody>
           <a:bodyPr rtlCol="0">
-            <a:normAutofit fontScale="85000" lnSpcReduction="20000"/>
+            <a:normAutofit/>
           </a:bodyPr>
           <a:lstStyle/>
           <a:p>
             <a:pPr rtl="0"/>
             <a:r>
-              <a:rPr lang="es-ES" b="1" dirty="0"/>
+              <a:rPr lang="es-ES" sz="1800" b="1" dirty="0"/>
               <a:t>Presentado por:</a:t>
             </a:r>
           </a:p>
           <a:p>
             <a:pPr rtl="0"/>
-            <a:endParaRPr lang="es-ES" b="1" dirty="0"/>
+            <a:endParaRPr lang="es-ES" sz="1800" b="1" dirty="0"/>
           </a:p>
           <a:p>
             <a:pPr rtl="0"/>
             <a:r>
-              <a:rPr lang="es-ES" dirty="0"/>
+              <a:rPr lang="es-ES" sz="1800" dirty="0"/>
               <a:t>- Joe sierra</a:t>
             </a:r>
           </a:p>
           <a:p>
             <a:pPr rtl="0"/>
             <a:r>
-              <a:rPr lang="es-ES" dirty="0"/>
+              <a:rPr lang="es-ES" sz="1800" dirty="0"/>
               <a:t>- Andrea Osorio</a:t>
             </a:r>
           </a:p>
           <a:p>
             <a:pPr rtl="0"/>
             <a:r>
-              <a:rPr lang="es-ES" dirty="0"/>
-              <a:t>- Cesar </a:t>
-            </a:r>
-            <a:r>
-              <a:rPr lang="es-ES" dirty="0" err="1"/>
-              <a:t>ariza</a:t>
-            </a:r>
-            <a:r>
-              <a:rPr lang="es-ES" dirty="0"/>
-              <a:t> </a:t>
+              <a:rPr lang="es-ES" sz="1800" dirty="0"/>
+              <a:t>- Cesar Ariza </a:t>
             </a:r>
           </a:p>
           <a:p>
             <a:pPr rtl="0"/>
             <a:r>
-              <a:rPr lang="es-ES" dirty="0"/>
-              <a:t>- </a:t>
-            </a:r>
-            <a:r>
-              <a:rPr lang="es-ES" dirty="0" err="1"/>
-              <a:t>Andres</a:t>
-            </a:r>
-            <a:r>
-              <a:rPr lang="es-ES" dirty="0"/>
-              <a:t> farias</a:t>
+              <a:rPr lang="es-ES" sz="1800" dirty="0"/>
+              <a:t>- Andrés farias</a:t>
             </a:r>
           </a:p>
         </p:txBody>
@@ -4221,16 +4221,21 @@
             <p:ph type="title"/>
           </p:nvPr>
         </p:nvSpPr>
-        <p:spPr/>
+        <p:spPr>
+          <a:xfrm>
+            <a:off x="1512802" y="156931"/>
+            <a:ext cx="9144001" cy="1371600"/>
+          </a:xfrm>
+        </p:spPr>
         <p:txBody>
           <a:bodyPr rtlCol="0">
             <a:normAutofit/>
           </a:bodyPr>
           <a:lstStyle/>
           <a:p>
-            <a:pPr rtl="0"/>
-            <a:r>
-              <a:rPr lang="es-ES" sz="6000" dirty="0"/>
+            <a:pPr algn="ctr" rtl="0"/>
+            <a:r>
+              <a:rPr lang="es-ES" sz="5400" dirty="0"/>
               <a:t>CASOS DE USO</a:t>
             </a:r>
           </a:p>
@@ -4246,44 +4251,318 @@
             <p:ph idx="1"/>
           </p:nvPr>
         </p:nvSpPr>
-        <p:spPr/>
+        <p:spPr>
+          <a:xfrm>
+            <a:off x="1522413" y="1752600"/>
+            <a:ext cx="9134391" cy="1084245"/>
+          </a:xfrm>
+        </p:spPr>
         <p:txBody>
           <a:bodyPr rtlCol="0">
-            <a:normAutofit lnSpcReduction="10000"/>
+            <a:normAutofit/>
           </a:bodyPr>
           <a:lstStyle/>
           <a:p>
-            <a:pPr marL="0" indent="0" rtl="0">
+            <a:pPr marL="0" indent="0" algn="just" rtl="0">
               <a:buNone/>
             </a:pPr>
             <a:r>
-              <a:rPr lang="es-ES" sz="4800" dirty="0"/>
-              <a:t>Descripción de las actividades que se realizaran en el procesos.</a:t>
-            </a:r>
-          </a:p>
-          <a:p>
-            <a:pPr marL="0" indent="0" rtl="0">
+              <a:rPr lang="es-ES" sz="3600" dirty="0"/>
+              <a:t>Descripción de las actividades que se realizaran en el proceso.</a:t>
+            </a:r>
+          </a:p>
+        </p:txBody>
+      </p:sp>
+      <p:sp>
+        <p:nvSpPr>
+          <p:cNvPr id="4" name="Título 12">
+            <a:extLst>
+              <a:ext uri="{FF2B5EF4-FFF2-40B4-BE49-F238E27FC236}">
+                <a16:creationId xmlns:a16="http://schemas.microsoft.com/office/drawing/2014/main" id="{32316D93-2640-4DB2-BBCB-583647350B42}"/>
+              </a:ext>
+            </a:extLst>
+          </p:cNvPr>
+          <p:cNvSpPr txBox="1">
+            <a:spLocks/>
+          </p:cNvSpPr>
+          <p:nvPr/>
+        </p:nvSpPr>
+        <p:spPr>
+          <a:xfrm>
+            <a:off x="1512801" y="2599184"/>
+            <a:ext cx="9144001" cy="1371600"/>
+          </a:xfrm>
+          <a:prstGeom prst="rect">
+            <a:avLst/>
+          </a:prstGeom>
+        </p:spPr>
+        <p:txBody>
+          <a:bodyPr vert="horz" lIns="91440" tIns="45720" rIns="91440" bIns="45720" rtlCol="0" anchor="b">
+            <a:normAutofit/>
+          </a:bodyPr>
+          <a:lstStyle>
+            <a:lvl1pPr algn="l" defTabSz="914400" rtl="0" eaLnBrk="1" latinLnBrk="0" hangingPunct="1">
+              <a:lnSpc>
+                <a:spcPct val="90000"/>
+              </a:lnSpc>
+              <a:spcBef>
+                <a:spcPct val="0"/>
+              </a:spcBef>
+              <a:buNone/>
+              <a:defRPr sz="3600" kern="1200" spc="100" baseline="0">
+                <a:solidFill>
+                  <a:schemeClr val="tx1"/>
+                </a:solidFill>
+                <a:latin typeface="+mj-lt"/>
+                <a:ea typeface="+mj-ea"/>
+                <a:cs typeface="+mj-cs"/>
+              </a:defRPr>
+            </a:lvl1pPr>
+          </a:lstStyle>
+          <a:p>
+            <a:pPr algn="ctr"/>
+            <a:r>
+              <a:rPr lang="es-ES" sz="5400" dirty="0"/>
+              <a:t>CASOS DE USO EXTENDIDO</a:t>
+            </a:r>
+          </a:p>
+        </p:txBody>
+      </p:sp>
+      <p:sp>
+        <p:nvSpPr>
+          <p:cNvPr id="5" name="Marcador de contenido 2">
+            <a:extLst>
+              <a:ext uri="{FF2B5EF4-FFF2-40B4-BE49-F238E27FC236}">
+                <a16:creationId xmlns:a16="http://schemas.microsoft.com/office/drawing/2014/main" id="{1191019E-D5C3-4E16-BA44-59571C6A1927}"/>
+              </a:ext>
+            </a:extLst>
+          </p:cNvPr>
+          <p:cNvSpPr txBox="1">
+            <a:spLocks/>
+          </p:cNvSpPr>
+          <p:nvPr/>
+        </p:nvSpPr>
+        <p:spPr>
+          <a:xfrm>
+            <a:off x="1527216" y="4021156"/>
+            <a:ext cx="9134391" cy="4114801"/>
+          </a:xfrm>
+          <a:prstGeom prst="rect">
+            <a:avLst/>
+          </a:prstGeom>
+        </p:spPr>
+        <p:txBody>
+          <a:bodyPr vert="horz" lIns="91440" tIns="45720" rIns="91440" bIns="45720" rtlCol="0">
+            <a:normAutofit/>
+          </a:bodyPr>
+          <a:lstStyle>
+            <a:lvl1pPr marL="223838" indent="-223838" algn="l" defTabSz="914400" rtl="0" eaLnBrk="1" latinLnBrk="0" hangingPunct="1">
+              <a:lnSpc>
+                <a:spcPct val="90000"/>
+              </a:lnSpc>
+              <a:spcBef>
+                <a:spcPts val="1800"/>
+              </a:spcBef>
+              <a:buClr>
+                <a:schemeClr val="accent1"/>
+              </a:buClr>
+              <a:buSzPct val="100000"/>
+              <a:buFont typeface="Arial" pitchFamily="34" charset="0"/>
+              <a:buChar char="•"/>
+              <a:defRPr sz="2400" kern="1200">
+                <a:solidFill>
+                  <a:schemeClr val="tx1"/>
+                </a:solidFill>
+                <a:latin typeface="+mn-lt"/>
+                <a:ea typeface="+mn-ea"/>
+                <a:cs typeface="+mn-cs"/>
+              </a:defRPr>
+            </a:lvl1pPr>
+            <a:lvl2pPr marL="463550" indent="-231775" algn="l" defTabSz="914400" rtl="0" eaLnBrk="1" latinLnBrk="0" hangingPunct="1">
+              <a:lnSpc>
+                <a:spcPct val="90000"/>
+              </a:lnSpc>
+              <a:spcBef>
+                <a:spcPts val="1200"/>
+              </a:spcBef>
+              <a:buClr>
+                <a:schemeClr val="accent1"/>
+              </a:buClr>
+              <a:buSzPct val="100000"/>
+              <a:buFont typeface="Arial" pitchFamily="34" charset="0"/>
+              <a:buChar char="•"/>
+              <a:defRPr sz="2000" kern="1200">
+                <a:solidFill>
+                  <a:schemeClr val="tx1"/>
+                </a:solidFill>
+                <a:latin typeface="+mn-lt"/>
+                <a:ea typeface="+mn-ea"/>
+                <a:cs typeface="+mn-cs"/>
+              </a:defRPr>
+            </a:lvl2pPr>
+            <a:lvl3pPr marL="682625" indent="-219075" algn="l" defTabSz="914400" rtl="0" eaLnBrk="1" latinLnBrk="0" hangingPunct="1">
+              <a:lnSpc>
+                <a:spcPct val="90000"/>
+              </a:lnSpc>
+              <a:spcBef>
+                <a:spcPts val="600"/>
+              </a:spcBef>
+              <a:buClr>
+                <a:schemeClr val="accent1"/>
+              </a:buClr>
+              <a:buSzPct val="100000"/>
+              <a:buFont typeface="Arial" pitchFamily="34" charset="0"/>
+              <a:buChar char="•"/>
+              <a:defRPr sz="1800" kern="1200">
+                <a:solidFill>
+                  <a:schemeClr val="tx1"/>
+                </a:solidFill>
+                <a:latin typeface="+mn-lt"/>
+                <a:ea typeface="+mn-ea"/>
+                <a:cs typeface="+mn-cs"/>
+              </a:defRPr>
+            </a:lvl3pPr>
+            <a:lvl4pPr marL="857250" indent="-174625" algn="l" defTabSz="914400" rtl="0" eaLnBrk="1" latinLnBrk="0" hangingPunct="1">
+              <a:lnSpc>
+                <a:spcPct val="90000"/>
+              </a:lnSpc>
+              <a:spcBef>
+                <a:spcPts val="600"/>
+              </a:spcBef>
+              <a:buClr>
+                <a:schemeClr val="accent1"/>
+              </a:buClr>
+              <a:buSzPct val="100000"/>
+              <a:buFont typeface="Arial" pitchFamily="34" charset="0"/>
+              <a:buChar char="•"/>
+              <a:defRPr sz="1600" kern="1200">
+                <a:solidFill>
+                  <a:schemeClr val="tx1"/>
+                </a:solidFill>
+                <a:latin typeface="+mn-lt"/>
+                <a:ea typeface="+mn-ea"/>
+                <a:cs typeface="+mn-cs"/>
+              </a:defRPr>
+            </a:lvl4pPr>
+            <a:lvl5pPr marL="1030288" indent="-173038" algn="l" defTabSz="914400" rtl="0" eaLnBrk="1" latinLnBrk="0" hangingPunct="1">
+              <a:lnSpc>
+                <a:spcPct val="90000"/>
+              </a:lnSpc>
+              <a:spcBef>
+                <a:spcPts val="600"/>
+              </a:spcBef>
+              <a:buClr>
+                <a:schemeClr val="accent1"/>
+              </a:buClr>
+              <a:buSzPct val="100000"/>
+              <a:buFont typeface="Arial" pitchFamily="34" charset="0"/>
+              <a:buChar char="•"/>
+              <a:defRPr sz="1600" kern="1200">
+                <a:solidFill>
+                  <a:schemeClr val="tx1"/>
+                </a:solidFill>
+                <a:latin typeface="+mn-lt"/>
+                <a:ea typeface="+mn-ea"/>
+                <a:cs typeface="+mn-cs"/>
+              </a:defRPr>
+            </a:lvl5pPr>
+            <a:lvl6pPr marL="1207008" indent="-173736" algn="l" defTabSz="914400" rtl="0" eaLnBrk="1" latinLnBrk="0" hangingPunct="1">
+              <a:spcBef>
+                <a:spcPts val="600"/>
+              </a:spcBef>
+              <a:buClr>
+                <a:schemeClr val="accent1"/>
+              </a:buClr>
+              <a:buFont typeface="Arial" pitchFamily="34" charset="0"/>
+              <a:buChar char="•"/>
+              <a:defRPr sz="1600" kern="1200">
+                <a:solidFill>
+                  <a:schemeClr val="tx1"/>
+                </a:solidFill>
+                <a:latin typeface="+mn-lt"/>
+                <a:ea typeface="+mn-ea"/>
+                <a:cs typeface="+mn-cs"/>
+              </a:defRPr>
+            </a:lvl6pPr>
+            <a:lvl7pPr marL="1380744" indent="-173736" algn="l" defTabSz="914400" rtl="0" eaLnBrk="1" latinLnBrk="0" hangingPunct="1">
+              <a:spcBef>
+                <a:spcPts val="600"/>
+              </a:spcBef>
+              <a:buClr>
+                <a:schemeClr val="accent1"/>
+              </a:buClr>
+              <a:buFont typeface="Arial" pitchFamily="34" charset="0"/>
+              <a:buChar char="•"/>
+              <a:defRPr sz="1600" kern="1200">
+                <a:solidFill>
+                  <a:schemeClr val="tx1"/>
+                </a:solidFill>
+                <a:latin typeface="+mn-lt"/>
+                <a:ea typeface="+mn-ea"/>
+                <a:cs typeface="+mn-cs"/>
+              </a:defRPr>
+            </a:lvl7pPr>
+            <a:lvl8pPr marL="1554480" indent="-173736" algn="l" defTabSz="914400" rtl="0" eaLnBrk="1" latinLnBrk="0" hangingPunct="1">
+              <a:spcBef>
+                <a:spcPts val="600"/>
+              </a:spcBef>
+              <a:buClr>
+                <a:schemeClr val="accent1"/>
+              </a:buClr>
+              <a:buFont typeface="Arial" pitchFamily="34" charset="0"/>
+              <a:buChar char="•"/>
+              <a:defRPr sz="1600" kern="1200">
+                <a:solidFill>
+                  <a:schemeClr val="tx1"/>
+                </a:solidFill>
+                <a:latin typeface="+mn-lt"/>
+                <a:ea typeface="+mn-ea"/>
+                <a:cs typeface="+mn-cs"/>
+              </a:defRPr>
+            </a:lvl8pPr>
+            <a:lvl9pPr marL="1728216" indent="-173736" algn="l" defTabSz="914400" rtl="0" eaLnBrk="1" latinLnBrk="0" hangingPunct="1">
+              <a:spcBef>
+                <a:spcPts val="600"/>
+              </a:spcBef>
+              <a:buClr>
+                <a:schemeClr val="accent1"/>
+              </a:buClr>
+              <a:buFont typeface="Arial" pitchFamily="34" charset="0"/>
+              <a:buChar char="•"/>
+              <a:defRPr sz="1600" kern="1200">
+                <a:solidFill>
+                  <a:schemeClr val="tx1"/>
+                </a:solidFill>
+                <a:latin typeface="+mn-lt"/>
+                <a:ea typeface="+mn-ea"/>
+                <a:cs typeface="+mn-cs"/>
+              </a:defRPr>
+            </a:lvl9pPr>
+          </a:lstStyle>
+          <a:p>
+            <a:pPr marL="0" indent="0">
               <a:buNone/>
             </a:pPr>
             <a:r>
-              <a:rPr lang="es-ES" sz="4800" dirty="0">
+              <a:rPr lang="es-CO" sz="3600" dirty="0"/>
+              <a:t>Diagrama que describe el contexto de la ingeniería de software del respectivo diagrama caso de uso.</a:t>
+            </a:r>
+          </a:p>
+          <a:p>
+            <a:pPr marL="0" indent="0">
+              <a:buNone/>
+            </a:pPr>
+            <a:r>
+              <a:rPr lang="es-CO" sz="3600" dirty="0"/>
+              <a:t>-</a:t>
+            </a:r>
+            <a:r>
+              <a:rPr lang="es-ES" sz="3600" dirty="0">
                 <a:hlinkClick r:id="rId2" action="ppaction://hlinkfile"/>
               </a:rPr>
-              <a:t>..\..\..\..\..\Desktop\</a:t>
-            </a:r>
-            <a:r>
-              <a:rPr lang="es-ES" sz="4800" dirty="0" err="1">
-                <a:hlinkClick r:id="rId2" action="ppaction://hlinkfile"/>
-              </a:rPr>
-              <a:t>loopsy</a:t>
-            </a:r>
-            <a:r>
-              <a:rPr lang="es-ES" sz="4800" dirty="0">
-                <a:hlinkClick r:id="rId2" action="ppaction://hlinkfile"/>
-              </a:rPr>
-              <a:t>-master\Documentos\Casos de Uso\Formato Documentación Casos de Uso.docx</a:t>
-            </a:r>
-            <a:endParaRPr lang="es-ES" sz="4800" dirty="0"/>
+              <a:t> Diagrama Casos de Uso</a:t>
+            </a:r>
+            <a:endParaRPr lang="es-CO" sz="3600" dirty="0"/>
           </a:p>
         </p:txBody>
       </p:sp>
@@ -4331,7 +4610,7 @@
       </p:grpSpPr>
       <p:sp>
         <p:nvSpPr>
-          <p:cNvPr id="13" name="Título 12"/>
+          <p:cNvPr id="2" name="Título 1"/>
           <p:cNvSpPr>
             <a:spLocks noGrp="1"/>
           </p:cNvSpPr>
@@ -4339,27 +4618,32 @@
             <p:ph type="title"/>
           </p:nvPr>
         </p:nvSpPr>
-        <p:spPr/>
+        <p:spPr>
+          <a:xfrm>
+            <a:off x="1341885" y="260648"/>
+            <a:ext cx="9324530" cy="1491952"/>
+          </a:xfrm>
+        </p:spPr>
         <p:txBody>
           <a:bodyPr rtlCol="0">
-            <a:normAutofit/>
+            <a:noAutofit/>
           </a:bodyPr>
           <a:lstStyle/>
           <a:p>
             <a:pPr rtl="0"/>
             <a:r>
               <a:rPr lang="es-ES" sz="5400" dirty="0"/>
-              <a:t>CASOS DE USO EXTENDIDO</a:t>
-            </a:r>
-          </a:p>
-        </p:txBody>
-      </p:sp>
-      <p:sp>
-        <p:nvSpPr>
-          <p:cNvPr id="3" name="Marcador de contenido 2">
+              <a:t>MODELO ENTIDAD DE RELACIÓN </a:t>
+            </a:r>
+          </a:p>
+        </p:txBody>
+      </p:sp>
+      <p:sp>
+        <p:nvSpPr>
+          <p:cNvPr id="7" name="Marcador de contenido 6">
             <a:extLst>
               <a:ext uri="{FF2B5EF4-FFF2-40B4-BE49-F238E27FC236}">
-                <a16:creationId xmlns:a16="http://schemas.microsoft.com/office/drawing/2014/main" id="{5DC91D8E-F5B0-46D7-8FDE-20EFF30EA58D}"/>
+                <a16:creationId xmlns:a16="http://schemas.microsoft.com/office/drawing/2014/main" id="{211860A1-3E7C-4E8C-BFB9-C1735E233EA3}"/>
               </a:ext>
             </a:extLst>
           </p:cNvPr>
@@ -4367,32 +4651,47 @@
             <a:spLocks noGrp="1"/>
           </p:cNvSpPr>
           <p:nvPr>
-            <p:ph idx="1"/>
-          </p:nvPr>
-        </p:nvSpPr>
-        <p:spPr/>
+            <p:ph sz="half" idx="1"/>
+          </p:nvPr>
+        </p:nvSpPr>
+        <p:spPr>
+          <a:xfrm>
+            <a:off x="1504781" y="1905001"/>
+            <a:ext cx="9054127" cy="4114800"/>
+          </a:xfrm>
+        </p:spPr>
         <p:txBody>
           <a:bodyPr>
             <a:normAutofit/>
           </a:bodyPr>
           <a:lstStyle/>
           <a:p>
-            <a:r>
-              <a:rPr lang="es-CO" sz="5400" dirty="0"/>
-              <a:t>Diagrama que describe el contexto de la ingeniería de </a:t>
-            </a:r>
-            <a:r>
-              <a:rPr lang="es-CO" sz="5400" dirty="0" err="1"/>
-              <a:t>sofware</a:t>
-            </a:r>
-            <a:endParaRPr lang="es-CO" sz="5400" dirty="0"/>
+            <a:pPr marL="0" indent="0">
+              <a:buNone/>
+            </a:pPr>
+            <a:r>
+              <a:rPr lang="es-CO" sz="4800" dirty="0"/>
+              <a:t>Modelo que representa las identidades de una estructura de datos.</a:t>
+            </a:r>
+          </a:p>
+          <a:p>
+            <a:pPr marL="0" indent="0">
+              <a:buNone/>
+            </a:pPr>
+            <a:r>
+              <a:rPr lang="es-CO" sz="4400" dirty="0">
+                <a:hlinkClick r:id="rId2" action="ppaction://hlinkfile"/>
+              </a:rPr>
+              <a:t>-Modelo (MER)</a:t>
+            </a:r>
+            <a:endParaRPr lang="es-CO" sz="4400" dirty="0"/>
           </a:p>
         </p:txBody>
       </p:sp>
     </p:spTree>
     <p:extLst>
       <p:ext uri="{BB962C8B-B14F-4D97-AF65-F5344CB8AC3E}">
-        <p14:creationId xmlns:p14="http://schemas.microsoft.com/office/powerpoint/2010/main" val="3106206852"/>
+        <p14:creationId xmlns:p14="http://schemas.microsoft.com/office/powerpoint/2010/main" val="4206988261"/>
       </p:ext>
     </p:extLst>
   </p:cSld>
@@ -4433,7 +4732,7 @@
       </p:grpSpPr>
       <p:sp>
         <p:nvSpPr>
-          <p:cNvPr id="2" name="Título 1"/>
+          <p:cNvPr id="13" name="Título 12"/>
           <p:cNvSpPr>
             <a:spLocks noGrp="1"/>
           </p:cNvSpPr>
@@ -4441,32 +4740,27 @@
             <p:ph type="title"/>
           </p:nvPr>
         </p:nvSpPr>
-        <p:spPr>
-          <a:xfrm>
-            <a:off x="1341885" y="260648"/>
-            <a:ext cx="9324530" cy="1491952"/>
-          </a:xfrm>
-        </p:spPr>
+        <p:spPr/>
         <p:txBody>
           <a:bodyPr rtlCol="0">
-            <a:noAutofit/>
+            <a:normAutofit/>
           </a:bodyPr>
           <a:lstStyle/>
           <a:p>
             <a:pPr rtl="0"/>
             <a:r>
-              <a:rPr lang="es-ES" sz="5400" dirty="0"/>
-              <a:t>MODELO ENTIDAD DE RELACIÓN </a:t>
-            </a:r>
-          </a:p>
-        </p:txBody>
-      </p:sp>
-      <p:sp>
-        <p:nvSpPr>
-          <p:cNvPr id="7" name="Marcador de contenido 6">
+              <a:rPr lang="es-ES" sz="6000" dirty="0"/>
+              <a:t>DICCIONARIO DE DATOS.</a:t>
+            </a:r>
+          </a:p>
+        </p:txBody>
+      </p:sp>
+      <p:sp>
+        <p:nvSpPr>
+          <p:cNvPr id="4" name="Marcador de contenido 3">
             <a:extLst>
               <a:ext uri="{FF2B5EF4-FFF2-40B4-BE49-F238E27FC236}">
-                <a16:creationId xmlns:a16="http://schemas.microsoft.com/office/drawing/2014/main" id="{211860A1-3E7C-4E8C-BFB9-C1735E233EA3}"/>
+                <a16:creationId xmlns:a16="http://schemas.microsoft.com/office/drawing/2014/main" id="{0419FB16-966C-44C1-AE5C-EA7364498F97}"/>
               </a:ext>
             </a:extLst>
           </p:cNvPr>
@@ -4474,45 +4768,37 @@
             <a:spLocks noGrp="1"/>
           </p:cNvSpPr>
           <p:nvPr>
-            <p:ph sz="half" idx="1"/>
-          </p:nvPr>
-        </p:nvSpPr>
-        <p:spPr>
-          <a:xfrm>
-            <a:off x="1504781" y="1905001"/>
-            <a:ext cx="9054127" cy="4114800"/>
-          </a:xfrm>
-        </p:spPr>
+            <p:ph idx="1"/>
+          </p:nvPr>
+        </p:nvSpPr>
+        <p:spPr/>
         <p:txBody>
           <a:bodyPr>
-            <a:normAutofit fontScale="92500" lnSpcReduction="20000"/>
+            <a:normAutofit/>
           </a:bodyPr>
           <a:lstStyle/>
           <a:p>
             <a:r>
-              <a:rPr lang="es-CO" sz="6000" dirty="0"/>
-              <a:t>Modelo de datos que representa las identidades de una base.</a:t>
-            </a:r>
-          </a:p>
-          <a:p>
-            <a:r>
-              <a:rPr lang="es-ES" sz="6000" dirty="0">
+              <a:rPr lang="es-CO" sz="4800" dirty="0"/>
+              <a:t>Lista de todos los elementos que forman parte del flujo de datos.</a:t>
+            </a:r>
+          </a:p>
+          <a:p>
+            <a:pPr marL="0" indent="0">
+              <a:buNone/>
+            </a:pPr>
+            <a:r>
+              <a:rPr lang="es-CO" sz="6000" dirty="0">
                 <a:hlinkClick r:id="rId2" action="ppaction://hlinkfile"/>
               </a:rPr>
-              <a:t>..\..\..\..\..\Desktop\</a:t>
-            </a:r>
-            <a:r>
-              <a:rPr lang="es-ES" sz="6000" dirty="0" err="1">
-                <a:hlinkClick r:id="rId2" action="ppaction://hlinkfile"/>
-              </a:rPr>
-              <a:t>loopsy</a:t>
-            </a:r>
-            <a:r>
-              <a:rPr lang="es-ES" sz="6000" dirty="0">
-                <a:hlinkClick r:id="rId2" action="ppaction://hlinkfile"/>
-              </a:rPr>
-              <a:t>-master\Documentos\Base de Datos\DB-Proyecto.html</a:t>
-            </a:r>
+              <a:t>-Diccionario de Datos</a:t>
+            </a:r>
+            <a:endParaRPr lang="es-CO" sz="6000" dirty="0"/>
+          </a:p>
+          <a:p>
+            <a:pPr marL="0" indent="0">
+              <a:buNone/>
+            </a:pPr>
             <a:endParaRPr lang="es-CO" sz="6000" dirty="0"/>
           </a:p>
         </p:txBody>
@@ -4520,7 +4806,7 @@
     </p:spTree>
     <p:extLst>
       <p:ext uri="{BB962C8B-B14F-4D97-AF65-F5344CB8AC3E}">
-        <p14:creationId xmlns:p14="http://schemas.microsoft.com/office/powerpoint/2010/main" val="4206988261"/>
+        <p14:creationId xmlns:p14="http://schemas.microsoft.com/office/powerpoint/2010/main" val="462238070"/>
       </p:ext>
     </p:extLst>
   </p:cSld>
@@ -4561,7 +4847,7 @@
       </p:grpSpPr>
       <p:sp>
         <p:nvSpPr>
-          <p:cNvPr id="13" name="Título 12"/>
+          <p:cNvPr id="2" name="Título 1"/>
           <p:cNvSpPr>
             <a:spLocks noGrp="1"/>
           </p:cNvSpPr>
@@ -4569,7 +4855,12 @@
             <p:ph type="title"/>
           </p:nvPr>
         </p:nvSpPr>
-        <p:spPr/>
+        <p:spPr>
+          <a:xfrm>
+            <a:off x="549796" y="-315416"/>
+            <a:ext cx="10081120" cy="2304256"/>
+          </a:xfrm>
+        </p:spPr>
         <p:txBody>
           <a:bodyPr rtlCol="0">
             <a:normAutofit/>
@@ -4578,70 +4869,77 @@
           <a:p>
             <a:pPr rtl="0"/>
             <a:r>
-              <a:rPr lang="es-ES" sz="6000" dirty="0"/>
-              <a:t>DICCIONARIO DE DATOS.</a:t>
-            </a:r>
-          </a:p>
-        </p:txBody>
-      </p:sp>
-      <p:sp>
-        <p:nvSpPr>
-          <p:cNvPr id="4" name="Marcador de contenido 3">
+              <a:rPr lang="en-US" sz="6000" dirty="0"/>
+              <a:t>CRONOGRAMA DE PROYECTO GANTT </a:t>
+            </a:r>
+          </a:p>
+        </p:txBody>
+      </p:sp>
+      <p:sp>
+        <p:nvSpPr>
+          <p:cNvPr id="4" name="CuadroTexto 3">
+            <a:hlinkClick r:id="rId2" action="ppaction://hlinkfile"/>
             <a:extLst>
               <a:ext uri="{FF2B5EF4-FFF2-40B4-BE49-F238E27FC236}">
-                <a16:creationId xmlns:a16="http://schemas.microsoft.com/office/drawing/2014/main" id="{0419FB16-966C-44C1-AE5C-EA7364498F97}"/>
+                <a16:creationId xmlns:a16="http://schemas.microsoft.com/office/drawing/2014/main" id="{3E4CB3C4-32A0-4BCF-BCA2-355A80B6E93A}"/>
               </a:ext>
             </a:extLst>
           </p:cNvPr>
-          <p:cNvSpPr>
-            <a:spLocks noGrp="1"/>
-          </p:cNvSpPr>
-          <p:nvPr>
-            <p:ph idx="1"/>
-          </p:nvPr>
-        </p:nvSpPr>
-        <p:spPr/>
-        <p:txBody>
-          <a:bodyPr>
-            <a:normAutofit fontScale="92500" lnSpcReduction="20000"/>
+          <p:cNvSpPr txBox="1"/>
+          <p:nvPr/>
+        </p:nvSpPr>
+        <p:spPr>
+          <a:xfrm>
+            <a:off x="405780" y="2420888"/>
+            <a:ext cx="11665296" cy="2400657"/>
+          </a:xfrm>
+          <a:prstGeom prst="rect">
+            <a:avLst/>
+          </a:prstGeom>
+          <a:noFill/>
+        </p:spPr>
+        <p:txBody>
+          <a:bodyPr wrap="square" rtlCol="0">
+            <a:spAutoFit/>
           </a:bodyPr>
           <a:lstStyle/>
           <a:p>
-            <a:r>
-              <a:rPr lang="es-CO" sz="6000" dirty="0"/>
-              <a:t>Lista de todos los elementos que forman parte del flujo de datos.</a:t>
-            </a:r>
-          </a:p>
-          <a:p>
-            <a:r>
-              <a:rPr lang="es-CO" sz="6000" dirty="0">
-                <a:hlinkClick r:id="rId2" action="ppaction://hlinkfile"/>
+            <a:pPr algn="just"/>
+            <a:r>
+              <a:rPr lang="es-MX" sz="4800" dirty="0" err="1"/>
+              <a:t>Grafíca</a:t>
+            </a:r>
+            <a:r>
+              <a:rPr lang="es-MX" sz="4800" dirty="0"/>
+              <a:t> que expone el tiempo e inversión de dedicación previsto para las diferentes tareas.</a:t>
+            </a:r>
+          </a:p>
+          <a:p>
+            <a:pPr algn="just"/>
+            <a:endParaRPr lang="es-CO" dirty="0"/>
+          </a:p>
+          <a:p>
+            <a:pPr algn="just"/>
+            <a:r>
+              <a:rPr lang="es-CO" sz="2800" dirty="0">
+                <a:hlinkClick r:id="rId3" action="ppaction://hlinkfile"/>
               </a:rPr>
-              <a:t>..\..\..\..\..\Desktop\</a:t>
-            </a:r>
-            <a:r>
-              <a:rPr lang="es-CO" sz="6000" dirty="0" err="1">
-                <a:hlinkClick r:id="rId2" action="ppaction://hlinkfile"/>
+              <a:t>-</a:t>
+            </a:r>
+            <a:r>
+              <a:rPr lang="es-CO" sz="3600" dirty="0">
+                <a:hlinkClick r:id="rId3" action="ppaction://hlinkfile"/>
               </a:rPr>
-              <a:t>loopsy</a:t>
-            </a:r>
-            <a:r>
-              <a:rPr lang="es-CO" sz="6000" dirty="0">
-                <a:hlinkClick r:id="rId2" action="ppaction://hlinkfile"/>
-              </a:rPr>
-              <a:t>-master\Documentos\DB-Proyecto.html</a:t>
-            </a:r>
-            <a:endParaRPr lang="es-CO" sz="6000" dirty="0"/>
-          </a:p>
-          <a:p>
-            <a:endParaRPr lang="es-CO" sz="6000" dirty="0"/>
+              <a:t>Project Loopsy</a:t>
+            </a:r>
+            <a:endParaRPr lang="es-CO" sz="2800" dirty="0"/>
           </a:p>
         </p:txBody>
       </p:sp>
     </p:spTree>
     <p:extLst>
       <p:ext uri="{BB962C8B-B14F-4D97-AF65-F5344CB8AC3E}">
-        <p14:creationId xmlns:p14="http://schemas.microsoft.com/office/powerpoint/2010/main" val="462238070"/>
+        <p14:creationId xmlns:p14="http://schemas.microsoft.com/office/powerpoint/2010/main" val="2478160142"/>
       </p:ext>
     </p:extLst>
   </p:cSld>
@@ -4682,188 +4980,37 @@
       </p:grpSpPr>
       <p:sp>
         <p:nvSpPr>
-          <p:cNvPr id="2" name="Título 1"/>
-          <p:cNvSpPr>
-            <a:spLocks noGrp="1"/>
-          </p:cNvSpPr>
-          <p:nvPr>
-            <p:ph type="title"/>
-          </p:nvPr>
-        </p:nvSpPr>
-        <p:spPr>
-          <a:xfrm>
-            <a:off x="549796" y="-315416"/>
-            <a:ext cx="10081120" cy="2304256"/>
-          </a:xfrm>
-        </p:spPr>
-        <p:txBody>
-          <a:bodyPr rtlCol="0">
-            <a:normAutofit/>
-          </a:bodyPr>
-          <a:lstStyle/>
-          <a:p>
-            <a:pPr rtl="0"/>
-            <a:r>
-              <a:rPr lang="en-US" sz="6000" dirty="0"/>
-              <a:t>CRONOGRAMA DE PROYECTO GANTT </a:t>
-            </a:r>
-          </a:p>
-        </p:txBody>
-      </p:sp>
-      <p:sp>
-        <p:nvSpPr>
-          <p:cNvPr id="4" name="CuadroTexto 3">
-            <a:hlinkClick r:id="rId2" action="ppaction://hlinkfile"/>
+          <p:cNvPr id="2" name="Título 1">
             <a:extLst>
               <a:ext uri="{FF2B5EF4-FFF2-40B4-BE49-F238E27FC236}">
-                <a16:creationId xmlns:a16="http://schemas.microsoft.com/office/drawing/2014/main" id="{3E4CB3C4-32A0-4BCF-BCA2-355A80B6E93A}"/>
+                <a16:creationId xmlns:a16="http://schemas.microsoft.com/office/drawing/2014/main" id="{CF78274B-0908-4A2D-83E2-816E868C75E4}"/>
               </a:ext>
             </a:extLst>
           </p:cNvPr>
-          <p:cNvSpPr txBox="1"/>
-          <p:nvPr/>
-        </p:nvSpPr>
-        <p:spPr>
-          <a:xfrm>
-            <a:off x="405780" y="2420888"/>
-            <a:ext cx="9145016" cy="4801314"/>
-          </a:xfrm>
-          <a:prstGeom prst="rect">
-            <a:avLst/>
-          </a:prstGeom>
-          <a:noFill/>
-        </p:spPr>
-        <p:txBody>
-          <a:bodyPr wrap="square" rtlCol="0">
-            <a:spAutoFit/>
-          </a:bodyPr>
+          <p:cNvSpPr>
+            <a:spLocks noGrp="1"/>
+          </p:cNvSpPr>
+          <p:nvPr>
+            <p:ph type="title"/>
+          </p:nvPr>
+        </p:nvSpPr>
+        <p:spPr/>
+        <p:txBody>
+          <a:bodyPr/>
           <a:lstStyle/>
           <a:p>
             <a:r>
-              <a:rPr lang="en-US" sz="4800" dirty="0" err="1"/>
-              <a:t>Grafíca</a:t>
-            </a:r>
-            <a:r>
-              <a:rPr lang="en-US" sz="4800" dirty="0"/>
-              <a:t> que </a:t>
-            </a:r>
-            <a:r>
-              <a:rPr lang="en-US" sz="4800" dirty="0" err="1"/>
-              <a:t>expone</a:t>
-            </a:r>
-            <a:r>
-              <a:rPr lang="en-US" sz="4800" dirty="0"/>
-              <a:t> el </a:t>
-            </a:r>
-            <a:r>
-              <a:rPr lang="en-US" sz="4800" dirty="0" err="1"/>
-              <a:t>tiempo</a:t>
-            </a:r>
-            <a:r>
-              <a:rPr lang="en-US" sz="4800" dirty="0"/>
-              <a:t> e </a:t>
-            </a:r>
-            <a:r>
-              <a:rPr lang="en-US" sz="4800" dirty="0" err="1"/>
-              <a:t>inversión</a:t>
-            </a:r>
-            <a:r>
-              <a:rPr lang="en-US" sz="4800" dirty="0"/>
-              <a:t> de </a:t>
-            </a:r>
-            <a:r>
-              <a:rPr lang="en-US" sz="4800" dirty="0" err="1"/>
-              <a:t>dedicación</a:t>
-            </a:r>
-            <a:r>
-              <a:rPr lang="en-US" sz="4800" dirty="0"/>
-              <a:t> </a:t>
-            </a:r>
-            <a:r>
-              <a:rPr lang="en-US" sz="4800" dirty="0" err="1"/>
-              <a:t>previsto</a:t>
-            </a:r>
-            <a:r>
-              <a:rPr lang="en-US" sz="4800" dirty="0"/>
-              <a:t> para las </a:t>
-            </a:r>
-            <a:r>
-              <a:rPr lang="en-US" sz="4800" dirty="0" err="1"/>
-              <a:t>diferentes</a:t>
-            </a:r>
-            <a:r>
-              <a:rPr lang="en-US" sz="4800" dirty="0"/>
-              <a:t> </a:t>
-            </a:r>
-            <a:r>
-              <a:rPr lang="en-US" sz="4800" dirty="0" err="1"/>
-              <a:t>tareas</a:t>
-            </a:r>
-            <a:r>
-              <a:rPr lang="en-US" sz="4800" dirty="0"/>
-              <a:t>.</a:t>
-            </a:r>
-          </a:p>
-          <a:p>
-            <a:r>
-              <a:rPr lang="en-US" sz="4800" dirty="0">
-                <a:hlinkClick r:id="rId3" action="ppaction://hlinkfile"/>
-              </a:rPr>
-              <a:t>..\..\..\..\..\Desktop\</a:t>
-            </a:r>
-            <a:r>
-              <a:rPr lang="en-US" sz="4800" dirty="0" err="1">
-                <a:hlinkClick r:id="rId3" action="ppaction://hlinkfile"/>
-              </a:rPr>
-              <a:t>loopsy</a:t>
-            </a:r>
-            <a:r>
-              <a:rPr lang="en-US" sz="4800" dirty="0">
-                <a:hlinkClick r:id="rId3" action="ppaction://hlinkfile"/>
-              </a:rPr>
-              <a:t>-master\</a:t>
-            </a:r>
-            <a:r>
-              <a:rPr lang="en-US" sz="4800" dirty="0" err="1">
-                <a:hlinkClick r:id="rId3" action="ppaction://hlinkfile"/>
-              </a:rPr>
-              <a:t>Documentos</a:t>
-            </a:r>
-            <a:r>
-              <a:rPr lang="en-US" sz="4800" dirty="0">
-                <a:hlinkClick r:id="rId3" action="ppaction://hlinkfile"/>
-              </a:rPr>
-              <a:t>\Project - </a:t>
-            </a:r>
-            <a:r>
-              <a:rPr lang="en-US" sz="4800" dirty="0" err="1">
-                <a:hlinkClick r:id="rId3" action="ppaction://hlinkfile"/>
-              </a:rPr>
-              <a:t>Cronogramas</a:t>
-            </a:r>
-            <a:r>
-              <a:rPr lang="en-US" sz="4800" dirty="0">
-                <a:hlinkClick r:id="rId3" action="ppaction://hlinkfile"/>
-              </a:rPr>
-              <a:t>\</a:t>
-            </a:r>
-            <a:r>
-              <a:rPr lang="en-US" sz="4800" dirty="0" err="1">
-                <a:hlinkClick r:id="rId3" action="ppaction://hlinkfile"/>
-              </a:rPr>
-              <a:t>loopsy.mpp</a:t>
-            </a:r>
-            <a:endParaRPr lang="en-US" sz="4800" dirty="0"/>
-          </a:p>
-          <a:p>
-            <a:endParaRPr lang="es-CO" dirty="0"/>
+              <a:rPr lang="es-419" dirty="0"/>
+              <a:t>Muchas Gracias…</a:t>
+            </a:r>
+            <a:endParaRPr lang="es-ES" dirty="0"/>
           </a:p>
         </p:txBody>
       </p:sp>
     </p:spTree>
     <p:extLst>
       <p:ext uri="{BB962C8B-B14F-4D97-AF65-F5344CB8AC3E}">
-        <p14:creationId xmlns:p14="http://schemas.microsoft.com/office/powerpoint/2010/main" val="2478160142"/>
+        <p14:creationId xmlns:p14="http://schemas.microsoft.com/office/powerpoint/2010/main" val="4195671802"/>
       </p:ext>
     </p:extLst>
   </p:cSld>
@@ -5665,6 +5812,15 @@
 </file>
 
 <file path=customXml/item1.xml><?xml version="1.0" encoding="utf-8"?>
+<?mso-contentType ?>
+<FormTemplates xmlns="http://schemas.microsoft.com/sharepoint/v3/contenttype/forms">
+  <Display>DocumentLibraryForm</Display>
+  <Edit>AssetEditForm</Edit>
+  <New>DocumentLibraryForm</New>
+</FormTemplates>
+</file>
+
+<file path=customXml/item2.xml><?xml version="1.0" encoding="utf-8"?>
 <ct:contentTypeSchema xmlns:ct="http://schemas.microsoft.com/office/2006/metadata/contentType" xmlns:ma="http://schemas.microsoft.com/office/2006/metadata/properties/metaAttributes" ct:_="" ma:_="" ma:contentTypeName="TemplateFile" ma:contentTypeID="0x0101006EDDDB5EE6D98C44930B742096920B300400F5B6D36B3EF94B4E9A635CDF2A18F5B8" ma:contentTypeVersion="72" ma:contentTypeDescription="Create a new document." ma:contentTypeScope="" ma:versionID="a23e56308344d904b51738559c3d67c9">
   <xsd:schema xmlns:xsd="http://www.w3.org/2001/XMLSchema" xmlns:xs="http://www.w3.org/2001/XMLSchema" xmlns:p="http://schemas.microsoft.com/office/2006/metadata/properties" xmlns:ns2="4873beb7-5857-4685-be1f-d57550cc96cc" targetNamespace="http://schemas.microsoft.com/office/2006/metadata/properties" ma:root="true" ma:fieldsID="cd0908cc4600e77bf5da051303e00c8d" ns2:_="">
     <xsd:import namespace="4873beb7-5857-4685-be1f-d57550cc96cc"/>
@@ -6704,15 +6860,6 @@
 </ct:contentTypeSchema>
 </file>
 
-<file path=customXml/item2.xml><?xml version="1.0" encoding="utf-8"?>
-<?mso-contentType ?>
-<FormTemplates xmlns="http://schemas.microsoft.com/sharepoint/v3/contenttype/forms">
-  <Display>DocumentLibraryForm</Display>
-  <Edit>AssetEditForm</Edit>
-  <New>DocumentLibraryForm</New>
-</FormTemplates>
-</file>
-
 <file path=customXml/item3.xml><?xml version="1.0" encoding="utf-8"?>
 <p:properties xmlns:p="http://schemas.microsoft.com/office/2006/metadata/properties" xmlns:xsi="http://www.w3.org/2001/XMLSchema-instance" xmlns:pc="http://schemas.microsoft.com/office/infopath/2007/PartnerControls">
   <documentManagement>
@@ -6841,6 +6988,14 @@
 </file>
 
 <file path=customXml/itemProps1.xml><?xml version="1.0" encoding="utf-8"?>
+<ds:datastoreItem xmlns:ds="http://schemas.openxmlformats.org/officeDocument/2006/customXml" ds:itemID="{74228E6B-D70C-44BB-A81F-A245495F612B}">
+  <ds:schemaRefs>
+    <ds:schemaRef ds:uri="http://schemas.microsoft.com/sharepoint/v3/contenttype/forms"/>
+  </ds:schemaRefs>
+</ds:datastoreItem>
+</file>
+
+<file path=customXml/itemProps2.xml><?xml version="1.0" encoding="utf-8"?>
 <ds:datastoreItem xmlns:ds="http://schemas.openxmlformats.org/officeDocument/2006/customXml" ds:itemID="{22CCB507-0646-4A50-A4F7-7F385079D589}">
   <ds:schemaRefs>
     <ds:schemaRef ds:uri="http://schemas.microsoft.com/office/2006/metadata/contentType"/>
@@ -6858,14 +7013,6 @@
 </ds:datastoreItem>
 </file>
 
-<file path=customXml/itemProps2.xml><?xml version="1.0" encoding="utf-8"?>
-<ds:datastoreItem xmlns:ds="http://schemas.openxmlformats.org/officeDocument/2006/customXml" ds:itemID="{74228E6B-D70C-44BB-A81F-A245495F612B}">
-  <ds:schemaRefs>
-    <ds:schemaRef ds:uri="http://schemas.microsoft.com/sharepoint/v3/contenttype/forms"/>
-  </ds:schemaRefs>
-</ds:datastoreItem>
-</file>
-
 <file path=customXml/itemProps3.xml><?xml version="1.0" encoding="utf-8"?>
 <ds:datastoreItem xmlns:ds="http://schemas.openxmlformats.org/officeDocument/2006/customXml" ds:itemID="{00E41224-0370-4595-877C-23316CD80004}">
   <ds:schemaRefs>

</xml_diff>